<commit_message>
updated to remove personal info
Signed-off-by: Dhiman Seal <furyx.ds@gmail.com>
</commit_message>
<xml_diff>
--- a/CoulombsLaw.pptx
+++ b/CoulombsLaw.pptx
@@ -8458,7 +8458,7 @@
           <a:noFill/>
           <a:extLst>
             <a:ext uri="{909E8E84-426E-40dd-AFC4-6F175D3DCCD1}">
-              <a14:hiddenFill xmlns:a14="http://schemas.microsoft.com/office/drawing/2010/main" xmlns="">
+              <a14:hiddenFill xmlns="" xmlns:a14="http://schemas.microsoft.com/office/drawing/2010/main">
                 <a:solidFill>
                   <a:srgbClr val="FFFFFF"/>
                 </a:solidFill>
@@ -8517,7 +8517,7 @@
             </a:ln>
             <a:extLst>
               <a:ext uri="{91240B29-F687-4f45-9708-019B960494DF}">
-                <a14:hiddenLine xmlns:a14="http://schemas.microsoft.com/office/drawing/2010/main" xmlns="" w="9525">
+                <a14:hiddenLine xmlns="" xmlns:a14="http://schemas.microsoft.com/office/drawing/2010/main" w="9525">
                   <a:solidFill>
                     <a:srgbClr val="000000"/>
                   </a:solidFill>
@@ -8607,7 +8607,7 @@
             </a:ln>
             <a:extLst>
               <a:ext uri="{91240B29-F687-4f45-9708-019B960494DF}">
-                <a14:hiddenLine xmlns:a14="http://schemas.microsoft.com/office/drawing/2010/main" xmlns="" w="9525">
+                <a14:hiddenLine xmlns="" xmlns:a14="http://schemas.microsoft.com/office/drawing/2010/main" w="9525">
                   <a:solidFill>
                     <a:srgbClr val="000000"/>
                   </a:solidFill>
@@ -8697,7 +8697,7 @@
             </a:ln>
             <a:extLst>
               <a:ext uri="{91240B29-F687-4f45-9708-019B960494DF}">
-                <a14:hiddenLine xmlns:a14="http://schemas.microsoft.com/office/drawing/2010/main" xmlns="" w="9525">
+                <a14:hiddenLine xmlns="" xmlns:a14="http://schemas.microsoft.com/office/drawing/2010/main" w="9525">
                   <a:solidFill>
                     <a:srgbClr val="000000"/>
                   </a:solidFill>
@@ -8731,7 +8731,7 @@
             </a:ln>
             <a:extLst>
               <a:ext uri="{91240B29-F687-4f45-9708-019B960494DF}">
-                <a14:hiddenLine xmlns:a14="http://schemas.microsoft.com/office/drawing/2010/main" xmlns="" w="9525">
+                <a14:hiddenLine xmlns="" xmlns:a14="http://schemas.microsoft.com/office/drawing/2010/main" w="9525">
                   <a:solidFill>
                     <a:srgbClr val="000000"/>
                   </a:solidFill>
@@ -8821,7 +8821,7 @@
             </a:ln>
             <a:extLst>
               <a:ext uri="{91240B29-F687-4f45-9708-019B960494DF}">
-                <a14:hiddenLine xmlns:a14="http://schemas.microsoft.com/office/drawing/2010/main" xmlns="" w="9525">
+                <a14:hiddenLine xmlns="" xmlns:a14="http://schemas.microsoft.com/office/drawing/2010/main" w="9525">
                   <a:solidFill>
                     <a:srgbClr val="000000"/>
                   </a:solidFill>
@@ -8883,7 +8883,7 @@
             </a:ln>
             <a:extLst>
               <a:ext uri="{91240B29-F687-4f45-9708-019B960494DF}">
-                <a14:hiddenLine xmlns:a14="http://schemas.microsoft.com/office/drawing/2010/main" xmlns="" w="9525">
+                <a14:hiddenLine xmlns="" xmlns:a14="http://schemas.microsoft.com/office/drawing/2010/main" w="9525">
                   <a:solidFill>
                     <a:srgbClr val="000000"/>
                   </a:solidFill>
@@ -8945,7 +8945,7 @@
             </a:ln>
             <a:extLst>
               <a:ext uri="{91240B29-F687-4f45-9708-019B960494DF}">
-                <a14:hiddenLine xmlns:a14="http://schemas.microsoft.com/office/drawing/2010/main" xmlns="" w="9525">
+                <a14:hiddenLine xmlns="" xmlns:a14="http://schemas.microsoft.com/office/drawing/2010/main" w="9525">
                   <a:solidFill>
                     <a:srgbClr val="000000"/>
                   </a:solidFill>
@@ -9035,7 +9035,7 @@
             </a:ln>
             <a:extLst>
               <a:ext uri="{91240B29-F687-4f45-9708-019B960494DF}">
-                <a14:hiddenLine xmlns:a14="http://schemas.microsoft.com/office/drawing/2010/main" xmlns="" w="9525">
+                <a14:hiddenLine xmlns="" xmlns:a14="http://schemas.microsoft.com/office/drawing/2010/main" w="9525">
                   <a:solidFill>
                     <a:srgbClr val="000000"/>
                   </a:solidFill>
@@ -9097,7 +9097,7 @@
             </a:ln>
             <a:extLst>
               <a:ext uri="{91240B29-F687-4f45-9708-019B960494DF}">
-                <a14:hiddenLine xmlns:a14="http://schemas.microsoft.com/office/drawing/2010/main" xmlns="" w="9525">
+                <a14:hiddenLine xmlns="" xmlns:a14="http://schemas.microsoft.com/office/drawing/2010/main" w="9525">
                   <a:solidFill>
                     <a:srgbClr val="000000"/>
                   </a:solidFill>
@@ -9159,7 +9159,7 @@
             </a:ln>
             <a:extLst>
               <a:ext uri="{91240B29-F687-4f45-9708-019B960494DF}">
-                <a14:hiddenLine xmlns:a14="http://schemas.microsoft.com/office/drawing/2010/main" xmlns="" w="9525">
+                <a14:hiddenLine xmlns="" xmlns:a14="http://schemas.microsoft.com/office/drawing/2010/main" w="9525">
                   <a:solidFill>
                     <a:srgbClr val="000000"/>
                   </a:solidFill>
@@ -9249,7 +9249,7 @@
             </a:ln>
             <a:extLst>
               <a:ext uri="{91240B29-F687-4f45-9708-019B960494DF}">
-                <a14:hiddenLine xmlns:a14="http://schemas.microsoft.com/office/drawing/2010/main" xmlns="" w="9525">
+                <a14:hiddenLine xmlns="" xmlns:a14="http://schemas.microsoft.com/office/drawing/2010/main" w="9525">
                   <a:solidFill>
                     <a:srgbClr val="000000"/>
                   </a:solidFill>
@@ -9339,7 +9339,7 @@
             </a:ln>
             <a:extLst>
               <a:ext uri="{91240B29-F687-4f45-9708-019B960494DF}">
-                <a14:hiddenLine xmlns:a14="http://schemas.microsoft.com/office/drawing/2010/main" xmlns="" w="9525">
+                <a14:hiddenLine xmlns="" xmlns:a14="http://schemas.microsoft.com/office/drawing/2010/main" w="9525">
                   <a:solidFill>
                     <a:srgbClr val="000000"/>
                   </a:solidFill>
@@ -9401,7 +9401,7 @@
             </a:ln>
             <a:extLst>
               <a:ext uri="{91240B29-F687-4f45-9708-019B960494DF}">
-                <a14:hiddenLine xmlns:a14="http://schemas.microsoft.com/office/drawing/2010/main" xmlns="" w="9525">
+                <a14:hiddenLine xmlns="" xmlns:a14="http://schemas.microsoft.com/office/drawing/2010/main" w="9525">
                   <a:solidFill>
                     <a:srgbClr val="000000"/>
                   </a:solidFill>
@@ -9511,7 +9511,7 @@
             </a:ln>
             <a:extLst>
               <a:ext uri="{91240B29-F687-4f45-9708-019B960494DF}">
-                <a14:hiddenLine xmlns:a14="http://schemas.microsoft.com/office/drawing/2010/main" xmlns="" w="9525">
+                <a14:hiddenLine xmlns="" xmlns:a14="http://schemas.microsoft.com/office/drawing/2010/main" w="9525">
                   <a:solidFill>
                     <a:srgbClr val="000000"/>
                   </a:solidFill>
@@ -9573,7 +9573,7 @@
             </a:ln>
             <a:extLst>
               <a:ext uri="{91240B29-F687-4f45-9708-019B960494DF}">
-                <a14:hiddenLine xmlns:a14="http://schemas.microsoft.com/office/drawing/2010/main" xmlns="" w="9525">
+                <a14:hiddenLine xmlns="" xmlns:a14="http://schemas.microsoft.com/office/drawing/2010/main" w="9525">
                   <a:solidFill>
                     <a:srgbClr val="000000"/>
                   </a:solidFill>
@@ -9663,7 +9663,7 @@
             </a:ln>
             <a:extLst>
               <a:ext uri="{91240B29-F687-4f45-9708-019B960494DF}">
-                <a14:hiddenLine xmlns:a14="http://schemas.microsoft.com/office/drawing/2010/main" xmlns="" w="9525">
+                <a14:hiddenLine xmlns="" xmlns:a14="http://schemas.microsoft.com/office/drawing/2010/main" w="9525">
                   <a:solidFill>
                     <a:srgbClr val="000000"/>
                   </a:solidFill>
@@ -9753,7 +9753,7 @@
             </a:ln>
             <a:extLst>
               <a:ext uri="{91240B29-F687-4f45-9708-019B960494DF}">
-                <a14:hiddenLine xmlns:a14="http://schemas.microsoft.com/office/drawing/2010/main" xmlns="" w="9525">
+                <a14:hiddenLine xmlns="" xmlns:a14="http://schemas.microsoft.com/office/drawing/2010/main" w="9525">
                   <a:solidFill>
                     <a:srgbClr val="000000"/>
                   </a:solidFill>
@@ -9815,7 +9815,7 @@
             </a:ln>
             <a:extLst>
               <a:ext uri="{91240B29-F687-4f45-9708-019B960494DF}">
-                <a14:hiddenLine xmlns:a14="http://schemas.microsoft.com/office/drawing/2010/main" xmlns="" w="9525">
+                <a14:hiddenLine xmlns="" xmlns:a14="http://schemas.microsoft.com/office/drawing/2010/main" w="9525">
                   <a:solidFill>
                     <a:srgbClr val="000000"/>
                   </a:solidFill>
@@ -9905,7 +9905,7 @@
             </a:ln>
             <a:extLst>
               <a:ext uri="{91240B29-F687-4f45-9708-019B960494DF}">
-                <a14:hiddenLine xmlns:a14="http://schemas.microsoft.com/office/drawing/2010/main" xmlns="" w="9525">
+                <a14:hiddenLine xmlns="" xmlns:a14="http://schemas.microsoft.com/office/drawing/2010/main" w="9525">
                   <a:solidFill>
                     <a:srgbClr val="000000"/>
                   </a:solidFill>
@@ -9995,7 +9995,7 @@
             </a:ln>
             <a:extLst>
               <a:ext uri="{91240B29-F687-4f45-9708-019B960494DF}">
-                <a14:hiddenLine xmlns:a14="http://schemas.microsoft.com/office/drawing/2010/main" xmlns="" w="9525">
+                <a14:hiddenLine xmlns="" xmlns:a14="http://schemas.microsoft.com/office/drawing/2010/main" w="9525">
                   <a:solidFill>
                     <a:srgbClr val="000000"/>
                   </a:solidFill>
@@ -10051,7 +10051,7 @@
             </a:ln>
             <a:extLst>
               <a:ext uri="{91240B29-F687-4f45-9708-019B960494DF}">
-                <a14:hiddenLine xmlns:a14="http://schemas.microsoft.com/office/drawing/2010/main" xmlns="" w="9525">
+                <a14:hiddenLine xmlns="" xmlns:a14="http://schemas.microsoft.com/office/drawing/2010/main" w="9525">
                   <a:solidFill>
                     <a:srgbClr val="000000"/>
                   </a:solidFill>
@@ -10141,7 +10141,7 @@
             </a:ln>
             <a:extLst>
               <a:ext uri="{91240B29-F687-4f45-9708-019B960494DF}">
-                <a14:hiddenLine xmlns:a14="http://schemas.microsoft.com/office/drawing/2010/main" xmlns="" w="9525">
+                <a14:hiddenLine xmlns="" xmlns:a14="http://schemas.microsoft.com/office/drawing/2010/main" w="9525">
                   <a:solidFill>
                     <a:srgbClr val="000000"/>
                   </a:solidFill>
@@ -10197,7 +10197,7 @@
             </a:ln>
             <a:extLst>
               <a:ext uri="{91240B29-F687-4f45-9708-019B960494DF}">
-                <a14:hiddenLine xmlns:a14="http://schemas.microsoft.com/office/drawing/2010/main" xmlns="" w="9525">
+                <a14:hiddenLine xmlns="" xmlns:a14="http://schemas.microsoft.com/office/drawing/2010/main" w="9525">
                   <a:solidFill>
                     <a:srgbClr val="000000"/>
                   </a:solidFill>
@@ -10287,7 +10287,7 @@
             </a:ln>
             <a:extLst>
               <a:ext uri="{91240B29-F687-4f45-9708-019B960494DF}">
-                <a14:hiddenLine xmlns:a14="http://schemas.microsoft.com/office/drawing/2010/main" xmlns="" w="9525">
+                <a14:hiddenLine xmlns="" xmlns:a14="http://schemas.microsoft.com/office/drawing/2010/main" w="9525">
                   <a:solidFill>
                     <a:srgbClr val="000000"/>
                   </a:solidFill>
@@ -10355,7 +10355,7 @@
             </a:ln>
             <a:extLst>
               <a:ext uri="{91240B29-F687-4f45-9708-019B960494DF}">
-                <a14:hiddenLine xmlns:a14="http://schemas.microsoft.com/office/drawing/2010/main" xmlns="" w="9525">
+                <a14:hiddenLine xmlns="" xmlns:a14="http://schemas.microsoft.com/office/drawing/2010/main" w="9525">
                   <a:solidFill>
                     <a:srgbClr val="000000"/>
                   </a:solidFill>
@@ -10445,7 +10445,7 @@
             </a:ln>
             <a:extLst>
               <a:ext uri="{91240B29-F687-4f45-9708-019B960494DF}">
-                <a14:hiddenLine xmlns:a14="http://schemas.microsoft.com/office/drawing/2010/main" xmlns="" w="9525">
+                <a14:hiddenLine xmlns="" xmlns:a14="http://schemas.microsoft.com/office/drawing/2010/main" w="9525">
                   <a:solidFill>
                     <a:srgbClr val="000000"/>
                   </a:solidFill>
@@ -10513,7 +10513,7 @@
             </a:ln>
             <a:extLst>
               <a:ext uri="{91240B29-F687-4f45-9708-019B960494DF}">
-                <a14:hiddenLine xmlns:a14="http://schemas.microsoft.com/office/drawing/2010/main" xmlns="" w="9525">
+                <a14:hiddenLine xmlns="" xmlns:a14="http://schemas.microsoft.com/office/drawing/2010/main" w="9525">
                   <a:solidFill>
                     <a:srgbClr val="000000"/>
                   </a:solidFill>
@@ -10603,7 +10603,7 @@
             </a:ln>
             <a:extLst>
               <a:ext uri="{91240B29-F687-4f45-9708-019B960494DF}">
-                <a14:hiddenLine xmlns:a14="http://schemas.microsoft.com/office/drawing/2010/main" xmlns="" w="9525">
+                <a14:hiddenLine xmlns="" xmlns:a14="http://schemas.microsoft.com/office/drawing/2010/main" w="9525">
                   <a:solidFill>
                     <a:srgbClr val="000000"/>
                   </a:solidFill>
@@ -10637,7 +10637,7 @@
             </a:ln>
             <a:extLst>
               <a:ext uri="{91240B29-F687-4f45-9708-019B960494DF}">
-                <a14:hiddenLine xmlns:a14="http://schemas.microsoft.com/office/drawing/2010/main" xmlns="" w="9525">
+                <a14:hiddenLine xmlns="" xmlns:a14="http://schemas.microsoft.com/office/drawing/2010/main" w="9525">
                   <a:solidFill>
                     <a:srgbClr val="000000"/>
                   </a:solidFill>
@@ -10727,7 +10727,7 @@
             </a:ln>
             <a:extLst>
               <a:ext uri="{91240B29-F687-4f45-9708-019B960494DF}">
-                <a14:hiddenLine xmlns:a14="http://schemas.microsoft.com/office/drawing/2010/main" xmlns="" w="9525">
+                <a14:hiddenLine xmlns="" xmlns:a14="http://schemas.microsoft.com/office/drawing/2010/main" w="9525">
                   <a:solidFill>
                     <a:srgbClr val="000000"/>
                   </a:solidFill>
@@ -10789,7 +10789,7 @@
             </a:ln>
             <a:extLst>
               <a:ext uri="{91240B29-F687-4f45-9708-019B960494DF}">
-                <a14:hiddenLine xmlns:a14="http://schemas.microsoft.com/office/drawing/2010/main" xmlns="" w="9525">
+                <a14:hiddenLine xmlns="" xmlns:a14="http://schemas.microsoft.com/office/drawing/2010/main" w="9525">
                   <a:solidFill>
                     <a:srgbClr val="000000"/>
                   </a:solidFill>
@@ -10851,7 +10851,7 @@
             </a:ln>
             <a:extLst>
               <a:ext uri="{91240B29-F687-4f45-9708-019B960494DF}">
-                <a14:hiddenLine xmlns:a14="http://schemas.microsoft.com/office/drawing/2010/main" xmlns="" w="9525">
+                <a14:hiddenLine xmlns="" xmlns:a14="http://schemas.microsoft.com/office/drawing/2010/main" w="9525">
                   <a:solidFill>
                     <a:srgbClr val="000000"/>
                   </a:solidFill>
@@ -10941,7 +10941,7 @@
             </a:ln>
             <a:extLst>
               <a:ext uri="{91240B29-F687-4f45-9708-019B960494DF}">
-                <a14:hiddenLine xmlns:a14="http://schemas.microsoft.com/office/drawing/2010/main" xmlns="" w="9525">
+                <a14:hiddenLine xmlns="" xmlns:a14="http://schemas.microsoft.com/office/drawing/2010/main" w="9525">
                   <a:solidFill>
                     <a:srgbClr val="000000"/>
                   </a:solidFill>
@@ -11009,7 +11009,7 @@
             </a:ln>
             <a:extLst>
               <a:ext uri="{91240B29-F687-4f45-9708-019B960494DF}">
-                <a14:hiddenLine xmlns:a14="http://schemas.microsoft.com/office/drawing/2010/main" xmlns="" w="9525">
+                <a14:hiddenLine xmlns="" xmlns:a14="http://schemas.microsoft.com/office/drawing/2010/main" w="9525">
                   <a:solidFill>
                     <a:srgbClr val="000000"/>
                   </a:solidFill>
@@ -11071,7 +11071,7 @@
             </a:ln>
             <a:extLst>
               <a:ext uri="{91240B29-F687-4f45-9708-019B960494DF}">
-                <a14:hiddenLine xmlns:a14="http://schemas.microsoft.com/office/drawing/2010/main" xmlns="" w="9525">
+                <a14:hiddenLine xmlns="" xmlns:a14="http://schemas.microsoft.com/office/drawing/2010/main" w="9525">
                   <a:solidFill>
                     <a:srgbClr val="000000"/>
                   </a:solidFill>
@@ -11161,7 +11161,7 @@
             </a:ln>
             <a:extLst>
               <a:ext uri="{91240B29-F687-4f45-9708-019B960494DF}">
-                <a14:hiddenLine xmlns:a14="http://schemas.microsoft.com/office/drawing/2010/main" xmlns="" w="9525">
+                <a14:hiddenLine xmlns="" xmlns:a14="http://schemas.microsoft.com/office/drawing/2010/main" w="9525">
                   <a:solidFill>
                     <a:srgbClr val="000000"/>
                   </a:solidFill>
@@ -11223,7 +11223,7 @@
             </a:ln>
             <a:extLst>
               <a:ext uri="{91240B29-F687-4f45-9708-019B960494DF}">
-                <a14:hiddenLine xmlns:a14="http://schemas.microsoft.com/office/drawing/2010/main" xmlns="" w="9525">
+                <a14:hiddenLine xmlns="" xmlns:a14="http://schemas.microsoft.com/office/drawing/2010/main" w="9525">
                   <a:solidFill>
                     <a:srgbClr val="000000"/>
                   </a:solidFill>
@@ -11313,7 +11313,7 @@
             </a:ln>
             <a:extLst>
               <a:ext uri="{91240B29-F687-4f45-9708-019B960494DF}">
-                <a14:hiddenLine xmlns:a14="http://schemas.microsoft.com/office/drawing/2010/main" xmlns="" w="9525">
+                <a14:hiddenLine xmlns="" xmlns:a14="http://schemas.microsoft.com/office/drawing/2010/main" w="9525">
                   <a:solidFill>
                     <a:srgbClr val="000000"/>
                   </a:solidFill>
@@ -11375,7 +11375,7 @@
             </a:ln>
             <a:extLst>
               <a:ext uri="{91240B29-F687-4f45-9708-019B960494DF}">
-                <a14:hiddenLine xmlns:a14="http://schemas.microsoft.com/office/drawing/2010/main" xmlns="" w="9525">
+                <a14:hiddenLine xmlns="" xmlns:a14="http://schemas.microsoft.com/office/drawing/2010/main" w="9525">
                   <a:solidFill>
                     <a:srgbClr val="000000"/>
                   </a:solidFill>
@@ -11465,7 +11465,7 @@
             </a:ln>
             <a:extLst>
               <a:ext uri="{91240B29-F687-4f45-9708-019B960494DF}">
-                <a14:hiddenLine xmlns:a14="http://schemas.microsoft.com/office/drawing/2010/main" xmlns="" w="9525">
+                <a14:hiddenLine xmlns="" xmlns:a14="http://schemas.microsoft.com/office/drawing/2010/main" w="9525">
                   <a:solidFill>
                     <a:srgbClr val="000000"/>
                   </a:solidFill>
@@ -11499,7 +11499,7 @@
             </a:ln>
             <a:extLst>
               <a:ext uri="{91240B29-F687-4f45-9708-019B960494DF}">
-                <a14:hiddenLine xmlns:a14="http://schemas.microsoft.com/office/drawing/2010/main" xmlns="" w="9525">
+                <a14:hiddenLine xmlns="" xmlns:a14="http://schemas.microsoft.com/office/drawing/2010/main" w="9525">
                   <a:solidFill>
                     <a:srgbClr val="000000"/>
                   </a:solidFill>
@@ -11564,7 +11564,7 @@
             </a:ln>
             <a:extLst>
               <a:ext uri="{91240B29-F687-4f45-9708-019B960494DF}">
-                <a14:hiddenLine xmlns:a14="http://schemas.microsoft.com/office/drawing/2010/main" xmlns="" w="9525">
+                <a14:hiddenLine xmlns="" xmlns:a14="http://schemas.microsoft.com/office/drawing/2010/main" w="9525">
                   <a:solidFill>
                     <a:srgbClr val="000000"/>
                   </a:solidFill>
@@ -11654,7 +11654,7 @@
             </a:ln>
             <a:extLst>
               <a:ext uri="{91240B29-F687-4f45-9708-019B960494DF}">
-                <a14:hiddenLine xmlns:a14="http://schemas.microsoft.com/office/drawing/2010/main" xmlns="" w="9525">
+                <a14:hiddenLine xmlns="" xmlns:a14="http://schemas.microsoft.com/office/drawing/2010/main" w="9525">
                   <a:solidFill>
                     <a:srgbClr val="000000"/>
                   </a:solidFill>
@@ -11716,7 +11716,7 @@
             </a:ln>
             <a:extLst>
               <a:ext uri="{91240B29-F687-4f45-9708-019B960494DF}">
-                <a14:hiddenLine xmlns:a14="http://schemas.microsoft.com/office/drawing/2010/main" xmlns="" w="9525">
+                <a14:hiddenLine xmlns="" xmlns:a14="http://schemas.microsoft.com/office/drawing/2010/main" w="9525">
                   <a:solidFill>
                     <a:srgbClr val="000000"/>
                   </a:solidFill>
@@ -11806,7 +11806,7 @@
             </a:ln>
             <a:extLst>
               <a:ext uri="{91240B29-F687-4f45-9708-019B960494DF}">
-                <a14:hiddenLine xmlns:a14="http://schemas.microsoft.com/office/drawing/2010/main" xmlns="" w="9525">
+                <a14:hiddenLine xmlns="" xmlns:a14="http://schemas.microsoft.com/office/drawing/2010/main" w="9525">
                   <a:solidFill>
                     <a:srgbClr val="000000"/>
                   </a:solidFill>
@@ -11896,7 +11896,7 @@
             </a:ln>
             <a:extLst>
               <a:ext uri="{91240B29-F687-4f45-9708-019B960494DF}">
-                <a14:hiddenLine xmlns:a14="http://schemas.microsoft.com/office/drawing/2010/main" xmlns="" w="9525">
+                <a14:hiddenLine xmlns="" xmlns:a14="http://schemas.microsoft.com/office/drawing/2010/main" w="9525">
                   <a:solidFill>
                     <a:srgbClr val="000000"/>
                   </a:solidFill>
@@ -11961,7 +11961,7 @@
             </a:ln>
             <a:extLst>
               <a:ext uri="{91240B29-F687-4f45-9708-019B960494DF}">
-                <a14:hiddenLine xmlns:a14="http://schemas.microsoft.com/office/drawing/2010/main" xmlns="" w="9525">
+                <a14:hiddenLine xmlns="" xmlns:a14="http://schemas.microsoft.com/office/drawing/2010/main" w="9525">
                   <a:solidFill>
                     <a:srgbClr val="000000"/>
                   </a:solidFill>
@@ -12023,7 +12023,7 @@
             </a:ln>
             <a:extLst>
               <a:ext uri="{91240B29-F687-4f45-9708-019B960494DF}">
-                <a14:hiddenLine xmlns:a14="http://schemas.microsoft.com/office/drawing/2010/main" xmlns="" w="9525">
+                <a14:hiddenLine xmlns="" xmlns:a14="http://schemas.microsoft.com/office/drawing/2010/main" w="9525">
                   <a:solidFill>
                     <a:srgbClr val="000000"/>
                   </a:solidFill>
@@ -12113,7 +12113,7 @@
             </a:ln>
             <a:extLst>
               <a:ext uri="{91240B29-F687-4f45-9708-019B960494DF}">
-                <a14:hiddenLine xmlns:a14="http://schemas.microsoft.com/office/drawing/2010/main" xmlns="" w="9525">
+                <a14:hiddenLine xmlns="" xmlns:a14="http://schemas.microsoft.com/office/drawing/2010/main" w="9525">
                   <a:solidFill>
                     <a:srgbClr val="000000"/>
                   </a:solidFill>
@@ -12203,7 +12203,7 @@
             </a:ln>
             <a:extLst>
               <a:ext uri="{91240B29-F687-4f45-9708-019B960494DF}">
-                <a14:hiddenLine xmlns:a14="http://schemas.microsoft.com/office/drawing/2010/main" xmlns="" w="9525">
+                <a14:hiddenLine xmlns="" xmlns:a14="http://schemas.microsoft.com/office/drawing/2010/main" w="9525">
                   <a:solidFill>
                     <a:srgbClr val="000000"/>
                   </a:solidFill>
@@ -12265,7 +12265,7 @@
             </a:ln>
             <a:extLst>
               <a:ext uri="{91240B29-F687-4f45-9708-019B960494DF}">
-                <a14:hiddenLine xmlns:a14="http://schemas.microsoft.com/office/drawing/2010/main" xmlns="" w="9525">
+                <a14:hiddenLine xmlns="" xmlns:a14="http://schemas.microsoft.com/office/drawing/2010/main" w="9525">
                   <a:solidFill>
                     <a:srgbClr val="000000"/>
                   </a:solidFill>
@@ -12385,7 +12385,7 @@
             </a:ln>
             <a:extLst>
               <a:ext uri="{91240B29-F687-4f45-9708-019B960494DF}">
-                <a14:hiddenLine xmlns:a14="http://schemas.microsoft.com/office/drawing/2010/main" xmlns="" w="9525">
+                <a14:hiddenLine xmlns="" xmlns:a14="http://schemas.microsoft.com/office/drawing/2010/main" w="9525">
                   <a:solidFill>
                     <a:srgbClr val="000000"/>
                   </a:solidFill>
@@ -12453,7 +12453,7 @@
             </a:ln>
             <a:extLst>
               <a:ext uri="{91240B29-F687-4f45-9708-019B960494DF}">
-                <a14:hiddenLine xmlns:a14="http://schemas.microsoft.com/office/drawing/2010/main" xmlns="" w="9525">
+                <a14:hiddenLine xmlns="" xmlns:a14="http://schemas.microsoft.com/office/drawing/2010/main" w="9525">
                   <a:solidFill>
                     <a:srgbClr val="000000"/>
                   </a:solidFill>
@@ -12543,7 +12543,7 @@
             </a:ln>
             <a:extLst>
               <a:ext uri="{91240B29-F687-4f45-9708-019B960494DF}">
-                <a14:hiddenLine xmlns:a14="http://schemas.microsoft.com/office/drawing/2010/main" xmlns="" w="9525">
+                <a14:hiddenLine xmlns="" xmlns:a14="http://schemas.microsoft.com/office/drawing/2010/main" w="9525">
                   <a:solidFill>
                     <a:srgbClr val="000000"/>
                   </a:solidFill>
@@ -21081,7 +21081,7 @@
           <a:noFill/>
           <a:extLst>
             <a:ext uri="{909E8E84-426E-40dd-AFC4-6F175D3DCCD1}">
-              <a14:hiddenFill xmlns:a14="http://schemas.microsoft.com/office/drawing/2010/main" xmlns="">
+              <a14:hiddenFill xmlns="" xmlns:a14="http://schemas.microsoft.com/office/drawing/2010/main">
                 <a:solidFill>
                   <a:srgbClr val="FFFFFF"/>
                 </a:solidFill>
@@ -21155,7 +21155,7 @@
               </a:ln>
               <a:extLst>
                 <a:ext uri="{91240B29-F687-4f45-9708-019B960494DF}">
-                  <a14:hiddenLine xmlns:a14="http://schemas.microsoft.com/office/drawing/2010/main" xmlns="" w="9525">
+                  <a14:hiddenLine xmlns="" xmlns:a14="http://schemas.microsoft.com/office/drawing/2010/main" w="9525">
                     <a:solidFill>
                       <a:srgbClr val="000000"/>
                     </a:solidFill>
@@ -21245,7 +21245,7 @@
               </a:ln>
               <a:extLst>
                 <a:ext uri="{91240B29-F687-4f45-9708-019B960494DF}">
-                  <a14:hiddenLine xmlns:a14="http://schemas.microsoft.com/office/drawing/2010/main" xmlns="" w="9525">
+                  <a14:hiddenLine xmlns="" xmlns:a14="http://schemas.microsoft.com/office/drawing/2010/main" w="9525">
                     <a:solidFill>
                       <a:srgbClr val="000000"/>
                     </a:solidFill>
@@ -21335,7 +21335,7 @@
               </a:ln>
               <a:extLst>
                 <a:ext uri="{91240B29-F687-4f45-9708-019B960494DF}">
-                  <a14:hiddenLine xmlns:a14="http://schemas.microsoft.com/office/drawing/2010/main" xmlns="" w="9525">
+                  <a14:hiddenLine xmlns="" xmlns:a14="http://schemas.microsoft.com/office/drawing/2010/main" w="9525">
                     <a:solidFill>
                       <a:srgbClr val="000000"/>
                     </a:solidFill>
@@ -21397,7 +21397,7 @@
               </a:ln>
               <a:extLst>
                 <a:ext uri="{91240B29-F687-4f45-9708-019B960494DF}">
-                  <a14:hiddenLine xmlns:a14="http://schemas.microsoft.com/office/drawing/2010/main" xmlns="" w="9525">
+                  <a14:hiddenLine xmlns="" xmlns:a14="http://schemas.microsoft.com/office/drawing/2010/main" w="9525">
                     <a:solidFill>
                       <a:srgbClr val="000000"/>
                     </a:solidFill>
@@ -21487,7 +21487,7 @@
               </a:ln>
               <a:extLst>
                 <a:ext uri="{91240B29-F687-4f45-9708-019B960494DF}">
-                  <a14:hiddenLine xmlns:a14="http://schemas.microsoft.com/office/drawing/2010/main" xmlns="" w="9525">
+                  <a14:hiddenLine xmlns="" xmlns:a14="http://schemas.microsoft.com/office/drawing/2010/main" w="9525">
                     <a:solidFill>
                       <a:srgbClr val="000000"/>
                     </a:solidFill>
@@ -21549,7 +21549,7 @@
               </a:ln>
               <a:extLst>
                 <a:ext uri="{91240B29-F687-4f45-9708-019B960494DF}">
-                  <a14:hiddenLine xmlns:a14="http://schemas.microsoft.com/office/drawing/2010/main" xmlns="" w="9525">
+                  <a14:hiddenLine xmlns="" xmlns:a14="http://schemas.microsoft.com/office/drawing/2010/main" w="9525">
                     <a:solidFill>
                       <a:srgbClr val="000000"/>
                     </a:solidFill>
@@ -21611,7 +21611,7 @@
               </a:ln>
               <a:extLst>
                 <a:ext uri="{91240B29-F687-4f45-9708-019B960494DF}">
-                  <a14:hiddenLine xmlns:a14="http://schemas.microsoft.com/office/drawing/2010/main" xmlns="" w="9525">
+                  <a14:hiddenLine xmlns="" xmlns:a14="http://schemas.microsoft.com/office/drawing/2010/main" w="9525">
                     <a:solidFill>
                       <a:srgbClr val="000000"/>
                     </a:solidFill>
@@ -21701,7 +21701,7 @@
               </a:ln>
               <a:extLst>
                 <a:ext uri="{91240B29-F687-4f45-9708-019B960494DF}">
-                  <a14:hiddenLine xmlns:a14="http://schemas.microsoft.com/office/drawing/2010/main" xmlns="" w="9525">
+                  <a14:hiddenLine xmlns="" xmlns:a14="http://schemas.microsoft.com/office/drawing/2010/main" w="9525">
                     <a:solidFill>
                       <a:srgbClr val="000000"/>
                     </a:solidFill>
@@ -21791,7 +21791,7 @@
               </a:ln>
               <a:extLst>
                 <a:ext uri="{91240B29-F687-4f45-9708-019B960494DF}">
-                  <a14:hiddenLine xmlns:a14="http://schemas.microsoft.com/office/drawing/2010/main" xmlns="" w="9525">
+                  <a14:hiddenLine xmlns="" xmlns:a14="http://schemas.microsoft.com/office/drawing/2010/main" w="9525">
                     <a:solidFill>
                       <a:srgbClr val="000000"/>
                     </a:solidFill>
@@ -21853,7 +21853,7 @@
               </a:ln>
               <a:extLst>
                 <a:ext uri="{91240B29-F687-4f45-9708-019B960494DF}">
-                  <a14:hiddenLine xmlns:a14="http://schemas.microsoft.com/office/drawing/2010/main" xmlns="" w="9525">
+                  <a14:hiddenLine xmlns="" xmlns:a14="http://schemas.microsoft.com/office/drawing/2010/main" w="9525">
                     <a:solidFill>
                       <a:srgbClr val="000000"/>
                     </a:solidFill>
@@ -21963,7 +21963,7 @@
               </a:ln>
               <a:extLst>
                 <a:ext uri="{91240B29-F687-4f45-9708-019B960494DF}">
-                  <a14:hiddenLine xmlns:a14="http://schemas.microsoft.com/office/drawing/2010/main" xmlns="" w="9525">
+                  <a14:hiddenLine xmlns="" xmlns:a14="http://schemas.microsoft.com/office/drawing/2010/main" w="9525">
                     <a:solidFill>
                       <a:srgbClr val="000000"/>
                     </a:solidFill>
@@ -22047,7 +22047,7 @@
               </a:ln>
               <a:extLst>
                 <a:ext uri="{91240B29-F687-4f45-9708-019B960494DF}">
-                  <a14:hiddenLine xmlns:a14="http://schemas.microsoft.com/office/drawing/2010/main" xmlns="" w="9525">
+                  <a14:hiddenLine xmlns="" xmlns:a14="http://schemas.microsoft.com/office/drawing/2010/main" w="9525">
                     <a:solidFill>
                       <a:srgbClr val="000000"/>
                     </a:solidFill>
@@ -22109,7 +22109,7 @@
               </a:ln>
               <a:extLst>
                 <a:ext uri="{91240B29-F687-4f45-9708-019B960494DF}">
-                  <a14:hiddenLine xmlns:a14="http://schemas.microsoft.com/office/drawing/2010/main" xmlns="" w="9525">
+                  <a14:hiddenLine xmlns="" xmlns:a14="http://schemas.microsoft.com/office/drawing/2010/main" w="9525">
                     <a:solidFill>
                       <a:srgbClr val="000000"/>
                     </a:solidFill>
@@ -22171,7 +22171,7 @@
               </a:ln>
               <a:extLst>
                 <a:ext uri="{91240B29-F687-4f45-9708-019B960494DF}">
-                  <a14:hiddenLine xmlns:a14="http://schemas.microsoft.com/office/drawing/2010/main" xmlns="" w="9525">
+                  <a14:hiddenLine xmlns="" xmlns:a14="http://schemas.microsoft.com/office/drawing/2010/main" w="9525">
                     <a:solidFill>
                       <a:srgbClr val="000000"/>
                     </a:solidFill>
@@ -22261,7 +22261,7 @@
               </a:ln>
               <a:extLst>
                 <a:ext uri="{91240B29-F687-4f45-9708-019B960494DF}">
-                  <a14:hiddenLine xmlns:a14="http://schemas.microsoft.com/office/drawing/2010/main" xmlns="" w="9525">
+                  <a14:hiddenLine xmlns="" xmlns:a14="http://schemas.microsoft.com/office/drawing/2010/main" w="9525">
                     <a:solidFill>
                       <a:srgbClr val="000000"/>
                     </a:solidFill>
@@ -22295,7 +22295,7 @@
               </a:ln>
               <a:extLst>
                 <a:ext uri="{91240B29-F687-4f45-9708-019B960494DF}">
-                  <a14:hiddenLine xmlns:a14="http://schemas.microsoft.com/office/drawing/2010/main" xmlns="" w="9525">
+                  <a14:hiddenLine xmlns="" xmlns:a14="http://schemas.microsoft.com/office/drawing/2010/main" w="9525">
                     <a:solidFill>
                       <a:srgbClr val="000000"/>
                     </a:solidFill>
@@ -22360,7 +22360,7 @@
               </a:ln>
               <a:extLst>
                 <a:ext uri="{91240B29-F687-4f45-9708-019B960494DF}">
-                  <a14:hiddenLine xmlns:a14="http://schemas.microsoft.com/office/drawing/2010/main" xmlns="" w="9525">
+                  <a14:hiddenLine xmlns="" xmlns:a14="http://schemas.microsoft.com/office/drawing/2010/main" w="9525">
                     <a:solidFill>
                       <a:srgbClr val="000000"/>
                     </a:solidFill>
@@ -22450,7 +22450,7 @@
               </a:ln>
               <a:extLst>
                 <a:ext uri="{91240B29-F687-4f45-9708-019B960494DF}">
-                  <a14:hiddenLine xmlns:a14="http://schemas.microsoft.com/office/drawing/2010/main" xmlns="" w="9525">
+                  <a14:hiddenLine xmlns="" xmlns:a14="http://schemas.microsoft.com/office/drawing/2010/main" w="9525">
                     <a:solidFill>
                       <a:srgbClr val="000000"/>
                     </a:solidFill>
@@ -22512,7 +22512,7 @@
               </a:ln>
               <a:extLst>
                 <a:ext uri="{91240B29-F687-4f45-9708-019B960494DF}">
-                  <a14:hiddenLine xmlns:a14="http://schemas.microsoft.com/office/drawing/2010/main" xmlns="" w="9525">
+                  <a14:hiddenLine xmlns="" xmlns:a14="http://schemas.microsoft.com/office/drawing/2010/main" w="9525">
                     <a:solidFill>
                       <a:srgbClr val="000000"/>
                     </a:solidFill>
@@ -22602,7 +22602,7 @@
               </a:ln>
               <a:extLst>
                 <a:ext uri="{91240B29-F687-4f45-9708-019B960494DF}">
-                  <a14:hiddenLine xmlns:a14="http://schemas.microsoft.com/office/drawing/2010/main" xmlns="" w="9525">
+                  <a14:hiddenLine xmlns="" xmlns:a14="http://schemas.microsoft.com/office/drawing/2010/main" w="9525">
                     <a:solidFill>
                       <a:srgbClr val="000000"/>
                     </a:solidFill>
@@ -22667,7 +22667,7 @@
               </a:ln>
               <a:extLst>
                 <a:ext uri="{91240B29-F687-4f45-9708-019B960494DF}">
-                  <a14:hiddenLine xmlns:a14="http://schemas.microsoft.com/office/drawing/2010/main" xmlns="" w="9525">
+                  <a14:hiddenLine xmlns="" xmlns:a14="http://schemas.microsoft.com/office/drawing/2010/main" w="9525">
                     <a:solidFill>
                       <a:srgbClr val="000000"/>
                     </a:solidFill>
@@ -22729,7 +22729,7 @@
               </a:ln>
               <a:extLst>
                 <a:ext uri="{91240B29-F687-4f45-9708-019B960494DF}">
-                  <a14:hiddenLine xmlns:a14="http://schemas.microsoft.com/office/drawing/2010/main" xmlns="" w="9525">
+                  <a14:hiddenLine xmlns="" xmlns:a14="http://schemas.microsoft.com/office/drawing/2010/main" w="9525">
                     <a:solidFill>
                       <a:srgbClr val="000000"/>
                     </a:solidFill>
@@ -22819,7 +22819,7 @@
               </a:ln>
               <a:extLst>
                 <a:ext uri="{91240B29-F687-4f45-9708-019B960494DF}">
-                  <a14:hiddenLine xmlns:a14="http://schemas.microsoft.com/office/drawing/2010/main" xmlns="" w="9525">
+                  <a14:hiddenLine xmlns="" xmlns:a14="http://schemas.microsoft.com/office/drawing/2010/main" w="9525">
                     <a:solidFill>
                       <a:srgbClr val="000000"/>
                     </a:solidFill>
@@ -22909,7 +22909,7 @@
               </a:ln>
               <a:extLst>
                 <a:ext uri="{91240B29-F687-4f45-9708-019B960494DF}">
-                  <a14:hiddenLine xmlns:a14="http://schemas.microsoft.com/office/drawing/2010/main" xmlns="" w="9525">
+                  <a14:hiddenLine xmlns="" xmlns:a14="http://schemas.microsoft.com/office/drawing/2010/main" w="9525">
                     <a:solidFill>
                       <a:srgbClr val="000000"/>
                     </a:solidFill>
@@ -22974,7 +22974,7 @@
               </a:ln>
               <a:extLst>
                 <a:ext uri="{91240B29-F687-4f45-9708-019B960494DF}">
-                  <a14:hiddenLine xmlns:a14="http://schemas.microsoft.com/office/drawing/2010/main" xmlns="" w="9525">
+                  <a14:hiddenLine xmlns="" xmlns:a14="http://schemas.microsoft.com/office/drawing/2010/main" w="9525">
                     <a:solidFill>
                       <a:srgbClr val="000000"/>
                     </a:solidFill>
@@ -23094,7 +23094,7 @@
               </a:ln>
               <a:extLst>
                 <a:ext uri="{91240B29-F687-4f45-9708-019B960494DF}">
-                  <a14:hiddenLine xmlns:a14="http://schemas.microsoft.com/office/drawing/2010/main" xmlns="" w="9525">
+                  <a14:hiddenLine xmlns="" xmlns:a14="http://schemas.microsoft.com/office/drawing/2010/main" w="9525">
                     <a:solidFill>
                       <a:srgbClr val="000000"/>
                     </a:solidFill>
@@ -23175,7 +23175,7 @@
               </a:ln>
               <a:extLst>
                 <a:ext uri="{91240B29-F687-4f45-9708-019B960494DF}">
-                  <a14:hiddenLine xmlns:a14="http://schemas.microsoft.com/office/drawing/2010/main" xmlns="" w="9525">
+                  <a14:hiddenLine xmlns="" xmlns:a14="http://schemas.microsoft.com/office/drawing/2010/main" w="9525">
                     <a:solidFill>
                       <a:srgbClr val="000000"/>
                     </a:solidFill>
@@ -23290,7 +23290,7 @@
               </a:ln>
               <a:extLst>
                 <a:ext uri="{91240B29-F687-4f45-9708-019B960494DF}">
-                  <a14:hiddenLine xmlns:a14="http://schemas.microsoft.com/office/drawing/2010/main" xmlns="" w="9525">
+                  <a14:hiddenLine xmlns="" xmlns:a14="http://schemas.microsoft.com/office/drawing/2010/main" w="9525">
                     <a:solidFill>
                       <a:srgbClr val="000000"/>
                     </a:solidFill>
@@ -23380,7 +23380,7 @@
               </a:ln>
               <a:extLst>
                 <a:ext uri="{91240B29-F687-4f45-9708-019B960494DF}">
-                  <a14:hiddenLine xmlns:a14="http://schemas.microsoft.com/office/drawing/2010/main" xmlns="" w="9525">
+                  <a14:hiddenLine xmlns="" xmlns:a14="http://schemas.microsoft.com/office/drawing/2010/main" w="9525">
                     <a:solidFill>
                       <a:srgbClr val="000000"/>
                     </a:solidFill>
@@ -23445,7 +23445,7 @@
               </a:ln>
               <a:extLst>
                 <a:ext uri="{91240B29-F687-4f45-9708-019B960494DF}">
-                  <a14:hiddenLine xmlns:a14="http://schemas.microsoft.com/office/drawing/2010/main" xmlns="" w="9525">
+                  <a14:hiddenLine xmlns="" xmlns:a14="http://schemas.microsoft.com/office/drawing/2010/main" w="9525">
                     <a:solidFill>
                       <a:srgbClr val="000000"/>
                     </a:solidFill>
@@ -23535,7 +23535,7 @@
               </a:ln>
               <a:extLst>
                 <a:ext uri="{91240B29-F687-4f45-9708-019B960494DF}">
-                  <a14:hiddenLine xmlns:a14="http://schemas.microsoft.com/office/drawing/2010/main" xmlns="" w="9525">
+                  <a14:hiddenLine xmlns="" xmlns:a14="http://schemas.microsoft.com/office/drawing/2010/main" w="9525">
                     <a:solidFill>
                       <a:srgbClr val="000000"/>
                     </a:solidFill>
@@ -23603,7 +23603,7 @@
               </a:ln>
               <a:extLst>
                 <a:ext uri="{91240B29-F687-4f45-9708-019B960494DF}">
-                  <a14:hiddenLine xmlns:a14="http://schemas.microsoft.com/office/drawing/2010/main" xmlns="" w="9525">
+                  <a14:hiddenLine xmlns="" xmlns:a14="http://schemas.microsoft.com/office/drawing/2010/main" w="9525">
                     <a:solidFill>
                       <a:srgbClr val="000000"/>
                     </a:solidFill>
@@ -23693,7 +23693,7 @@
               </a:ln>
               <a:extLst>
                 <a:ext uri="{91240B29-F687-4f45-9708-019B960494DF}">
-                  <a14:hiddenLine xmlns:a14="http://schemas.microsoft.com/office/drawing/2010/main" xmlns="" w="9525">
+                  <a14:hiddenLine xmlns="" xmlns:a14="http://schemas.microsoft.com/office/drawing/2010/main" w="9525">
                     <a:solidFill>
                       <a:srgbClr val="000000"/>
                     </a:solidFill>
@@ -23761,7 +23761,7 @@
               </a:ln>
               <a:extLst>
                 <a:ext uri="{91240B29-F687-4f45-9708-019B960494DF}">
-                  <a14:hiddenLine xmlns:a14="http://schemas.microsoft.com/office/drawing/2010/main" xmlns="" w="9525">
+                  <a14:hiddenLine xmlns="" xmlns:a14="http://schemas.microsoft.com/office/drawing/2010/main" w="9525">
                     <a:solidFill>
                       <a:srgbClr val="000000"/>
                     </a:solidFill>
@@ -23851,7 +23851,7 @@
               </a:ln>
               <a:extLst>
                 <a:ext uri="{91240B29-F687-4f45-9708-019B960494DF}">
-                  <a14:hiddenLine xmlns:a14="http://schemas.microsoft.com/office/drawing/2010/main" xmlns="" w="9525">
+                  <a14:hiddenLine xmlns="" xmlns:a14="http://schemas.microsoft.com/office/drawing/2010/main" w="9525">
                     <a:solidFill>
                       <a:srgbClr val="000000"/>
                     </a:solidFill>
@@ -23885,7 +23885,7 @@
               </a:ln>
               <a:extLst>
                 <a:ext uri="{91240B29-F687-4f45-9708-019B960494DF}">
-                  <a14:hiddenLine xmlns:a14="http://schemas.microsoft.com/office/drawing/2010/main" xmlns="" w="9525">
+                  <a14:hiddenLine xmlns="" xmlns:a14="http://schemas.microsoft.com/office/drawing/2010/main" w="9525">
                     <a:solidFill>
                       <a:srgbClr val="000000"/>
                     </a:solidFill>
@@ -24484,8 +24484,8 @@
         </p:nvSpPr>
         <p:spPr>
           <a:xfrm>
-            <a:off x="2590799" y="1798599"/>
-            <a:ext cx="9850649" cy="1866460"/>
+            <a:off x="2759475" y="2144827"/>
+            <a:ext cx="8799251" cy="2125331"/>
           </a:xfrm>
           <a:noFill/>
           <a:ln>
@@ -24513,7 +24513,7 @@
           <a:lstStyle/>
           <a:p>
             <a:r>
-              <a:rPr lang="en-US" cap="none" dirty="0">
+              <a:rPr lang="en-US" sz="5400" cap="none" dirty="0">
                 <a:ln w="0"/>
                 <a:solidFill>
                   <a:schemeClr val="tx1"/>
@@ -24529,7 +24529,7 @@
               <a:t>Electromagnetic Field Theory: </a:t>
             </a:r>
             <a:br>
-              <a:rPr lang="en-US" cap="none" dirty="0">
+              <a:rPr lang="en-US" sz="5400" cap="none" dirty="0">
                 <a:ln w="0"/>
                 <a:solidFill>
                   <a:schemeClr val="tx1"/>
@@ -24544,7 +24544,7 @@
               </a:rPr>
             </a:br>
             <a:r>
-              <a:rPr lang="en-US" cap="none" dirty="0">
+              <a:rPr lang="en-US" sz="5400" cap="none" dirty="0">
                 <a:ln w="0"/>
                 <a:solidFill>
                   <a:schemeClr val="tx1"/>
@@ -24558,91 +24558,6 @@
                 </a:effectLst>
               </a:rPr>
               <a:t>A Project on Coulomb’s Law</a:t>
-            </a:r>
-          </a:p>
-        </p:txBody>
-      </p:sp>
-      <p:sp>
-        <p:nvSpPr>
-          <p:cNvPr id="3" name="Subtitle 2"/>
-          <p:cNvSpPr>
-            <a:spLocks noGrp="1"/>
-          </p:cNvSpPr>
-          <p:nvPr>
-            <p:ph type="subTitle" idx="1"/>
-          </p:nvPr>
-        </p:nvSpPr>
-        <p:spPr>
-          <a:xfrm>
-            <a:off x="2992648" y="3665059"/>
-            <a:ext cx="9448800" cy="685800"/>
-          </a:xfrm>
-          <a:noFill/>
-          <a:ln>
-            <a:noFill/>
-          </a:ln>
-        </p:spPr>
-        <p:style>
-          <a:lnRef idx="0">
-            <a:scrgbClr r="0" g="0" b="0"/>
-          </a:lnRef>
-          <a:fillRef idx="0">
-            <a:scrgbClr r="0" g="0" b="0"/>
-          </a:fillRef>
-          <a:effectRef idx="0">
-            <a:scrgbClr r="0" g="0" b="0"/>
-          </a:effectRef>
-          <a:fontRef idx="minor">
-            <a:schemeClr val="dk1"/>
-          </a:fontRef>
-        </p:style>
-        <p:txBody>
-          <a:bodyPr>
-            <a:normAutofit fontScale="92500" lnSpcReduction="20000"/>
-          </a:bodyPr>
-          <a:lstStyle/>
-          <a:p>
-            <a:r>
-              <a:rPr lang="en-US" sz="1600" b="1" dirty="0">
-                <a:solidFill>
-                  <a:schemeClr val="tx1">
-                    <a:lumMod val="75000"/>
-                  </a:schemeClr>
-                </a:solidFill>
-              </a:rPr>
-              <a:t>Subject code:</a:t>
-            </a:r>
-            <a:r>
-              <a:rPr lang="en-US" sz="1600" dirty="0">
-                <a:solidFill>
-                  <a:schemeClr val="tx1">
-                    <a:lumMod val="75000"/>
-                  </a:schemeClr>
-                </a:solidFill>
-              </a:rPr>
-              <a:t> EC-210</a:t>
-            </a:r>
-          </a:p>
-          <a:p>
-            <a:r>
-              <a:rPr lang="en-US" sz="1600" b="1" dirty="0">
-                <a:solidFill>
-                  <a:schemeClr val="tx1">
-                    <a:lumMod val="75000"/>
-                  </a:schemeClr>
-                </a:solidFill>
-              </a:rPr>
-              <a:t>Scholar ID: </a:t>
-            </a:r>
-            <a:r>
-              <a:rPr lang="en-US" sz="1600" dirty="0">
-                <a:solidFill>
-                  <a:schemeClr val="tx1">
-                    <a:lumMod val="75000"/>
-                  </a:schemeClr>
-                </a:solidFill>
-              </a:rPr>
-              <a:t>18-14-071</a:t>
             </a:r>
           </a:p>
         </p:txBody>
@@ -40007,312 +39922,19 @@
         </p:nvSpPr>
         <p:spPr>
           <a:xfrm>
-            <a:off x="2749201" y="2426825"/>
-            <a:ext cx="5538271" cy="1320800"/>
+            <a:off x="1781535" y="2346925"/>
+            <a:ext cx="7912881" cy="2304973"/>
           </a:xfrm>
         </p:spPr>
         <p:txBody>
           <a:bodyPr>
-            <a:normAutofit/>
+            <a:noAutofit/>
           </a:bodyPr>
           <a:lstStyle/>
           <a:p>
             <a:r>
-              <a:rPr lang="en-IN" sz="8000" dirty="0"/>
+              <a:rPr lang="en-IN" sz="11500" dirty="0"/>
               <a:t>Thank You.</a:t>
-            </a:r>
-          </a:p>
-        </p:txBody>
-      </p:sp>
-      <p:sp>
-        <p:nvSpPr>
-          <p:cNvPr id="4" name="Subtitle 2">
-            <a:extLst>
-              <a:ext uri="{FF2B5EF4-FFF2-40B4-BE49-F238E27FC236}">
-                <a16:creationId xmlns:a16="http://schemas.microsoft.com/office/drawing/2014/main" id="{46B4AAA3-7CA7-4962-85DD-A243AFD14411}"/>
-              </a:ext>
-            </a:extLst>
-          </p:cNvPr>
-          <p:cNvSpPr txBox="1">
-            <a:spLocks/>
-          </p:cNvSpPr>
-          <p:nvPr/>
-        </p:nvSpPr>
-        <p:spPr>
-          <a:xfrm>
-            <a:off x="4340720" y="3770775"/>
-            <a:ext cx="2355234" cy="685800"/>
-          </a:xfrm>
-          <a:prstGeom prst="rect">
-            <a:avLst/>
-          </a:prstGeom>
-        </p:spPr>
-        <p:style>
-          <a:lnRef idx="0">
-            <a:scrgbClr r="0" g="0" b="0"/>
-          </a:lnRef>
-          <a:fillRef idx="0">
-            <a:scrgbClr r="0" g="0" b="0"/>
-          </a:fillRef>
-          <a:effectRef idx="0">
-            <a:scrgbClr r="0" g="0" b="0"/>
-          </a:effectRef>
-          <a:fontRef idx="minor">
-            <a:schemeClr val="dk1"/>
-          </a:fontRef>
-        </p:style>
-        <p:txBody>
-          <a:bodyPr vert="horz" lIns="91440" tIns="45720" rIns="91440" bIns="45720" rtlCol="0">
-            <a:normAutofit lnSpcReduction="10000"/>
-          </a:bodyPr>
-          <a:lstStyle>
-            <a:lvl1pPr marL="342900" indent="-342900" algn="l" defTabSz="457200" rtl="0" eaLnBrk="1" latinLnBrk="0" hangingPunct="1">
-              <a:spcBef>
-                <a:spcPts val="1000"/>
-              </a:spcBef>
-              <a:spcAft>
-                <a:spcPts val="0"/>
-              </a:spcAft>
-              <a:buClr>
-                <a:schemeClr val="accent1"/>
-              </a:buClr>
-              <a:buSzPct val="80000"/>
-              <a:buFont typeface="Wingdings 3" charset="2"/>
-              <a:buChar char=""/>
-              <a:defRPr sz="1800" kern="1200">
-                <a:solidFill>
-                  <a:schemeClr val="dk1"/>
-                </a:solidFill>
-                <a:latin typeface="+mn-lt"/>
-                <a:ea typeface="+mn-ea"/>
-                <a:cs typeface="+mn-cs"/>
-              </a:defRPr>
-            </a:lvl1pPr>
-            <a:lvl2pPr marL="742950" indent="-285750" algn="l" defTabSz="457200" rtl="0" eaLnBrk="1" latinLnBrk="0" hangingPunct="1">
-              <a:spcBef>
-                <a:spcPts val="1000"/>
-              </a:spcBef>
-              <a:spcAft>
-                <a:spcPts val="0"/>
-              </a:spcAft>
-              <a:buClr>
-                <a:schemeClr val="accent1"/>
-              </a:buClr>
-              <a:buSzPct val="80000"/>
-              <a:buFont typeface="Wingdings 3" charset="2"/>
-              <a:buChar char=""/>
-              <a:defRPr sz="1600" kern="1200">
-                <a:solidFill>
-                  <a:schemeClr val="dk1"/>
-                </a:solidFill>
-                <a:latin typeface="+mn-lt"/>
-                <a:ea typeface="+mn-ea"/>
-                <a:cs typeface="+mn-cs"/>
-              </a:defRPr>
-            </a:lvl2pPr>
-            <a:lvl3pPr marL="1143000" indent="-228600" algn="l" defTabSz="457200" rtl="0" eaLnBrk="1" latinLnBrk="0" hangingPunct="1">
-              <a:spcBef>
-                <a:spcPts val="1000"/>
-              </a:spcBef>
-              <a:spcAft>
-                <a:spcPts val="0"/>
-              </a:spcAft>
-              <a:buClr>
-                <a:schemeClr val="accent1"/>
-              </a:buClr>
-              <a:buSzPct val="80000"/>
-              <a:buFont typeface="Wingdings 3" charset="2"/>
-              <a:buChar char=""/>
-              <a:defRPr sz="1400" kern="1200">
-                <a:solidFill>
-                  <a:schemeClr val="dk1"/>
-                </a:solidFill>
-                <a:latin typeface="+mn-lt"/>
-                <a:ea typeface="+mn-ea"/>
-                <a:cs typeface="+mn-cs"/>
-              </a:defRPr>
-            </a:lvl3pPr>
-            <a:lvl4pPr marL="1600200" indent="-228600" algn="l" defTabSz="457200" rtl="0" eaLnBrk="1" latinLnBrk="0" hangingPunct="1">
-              <a:spcBef>
-                <a:spcPts val="1000"/>
-              </a:spcBef>
-              <a:spcAft>
-                <a:spcPts val="0"/>
-              </a:spcAft>
-              <a:buClr>
-                <a:schemeClr val="accent1"/>
-              </a:buClr>
-              <a:buSzPct val="80000"/>
-              <a:buFont typeface="Wingdings 3" charset="2"/>
-              <a:buChar char=""/>
-              <a:defRPr sz="1200" kern="1200">
-                <a:solidFill>
-                  <a:schemeClr val="dk1"/>
-                </a:solidFill>
-                <a:latin typeface="+mn-lt"/>
-                <a:ea typeface="+mn-ea"/>
-                <a:cs typeface="+mn-cs"/>
-              </a:defRPr>
-            </a:lvl4pPr>
-            <a:lvl5pPr marL="2057400" indent="-228600" algn="l" defTabSz="457200" rtl="0" eaLnBrk="1" latinLnBrk="0" hangingPunct="1">
-              <a:spcBef>
-                <a:spcPts val="1000"/>
-              </a:spcBef>
-              <a:spcAft>
-                <a:spcPts val="0"/>
-              </a:spcAft>
-              <a:buClr>
-                <a:schemeClr val="accent1"/>
-              </a:buClr>
-              <a:buSzPct val="80000"/>
-              <a:buFont typeface="Wingdings 3" charset="2"/>
-              <a:buChar char=""/>
-              <a:defRPr sz="1200" kern="1200">
-                <a:solidFill>
-                  <a:schemeClr val="dk1"/>
-                </a:solidFill>
-                <a:latin typeface="+mn-lt"/>
-                <a:ea typeface="+mn-ea"/>
-                <a:cs typeface="+mn-cs"/>
-              </a:defRPr>
-            </a:lvl5pPr>
-            <a:lvl6pPr marL="2514600" indent="-228600" algn="l" defTabSz="457200" rtl="0" eaLnBrk="1" latinLnBrk="0" hangingPunct="1">
-              <a:spcBef>
-                <a:spcPts val="1000"/>
-              </a:spcBef>
-              <a:spcAft>
-                <a:spcPts val="0"/>
-              </a:spcAft>
-              <a:buClr>
-                <a:schemeClr val="accent1"/>
-              </a:buClr>
-              <a:buSzPct val="80000"/>
-              <a:buFont typeface="Wingdings 3" charset="2"/>
-              <a:buChar char=""/>
-              <a:defRPr sz="1200" kern="1200">
-                <a:solidFill>
-                  <a:schemeClr val="dk1"/>
-                </a:solidFill>
-                <a:latin typeface="+mn-lt"/>
-                <a:ea typeface="+mn-ea"/>
-                <a:cs typeface="+mn-cs"/>
-              </a:defRPr>
-            </a:lvl6pPr>
-            <a:lvl7pPr marL="2971800" indent="-228600" algn="l" defTabSz="457200" rtl="0" eaLnBrk="1" latinLnBrk="0" hangingPunct="1">
-              <a:spcBef>
-                <a:spcPts val="1000"/>
-              </a:spcBef>
-              <a:spcAft>
-                <a:spcPts val="0"/>
-              </a:spcAft>
-              <a:buClr>
-                <a:schemeClr val="accent1"/>
-              </a:buClr>
-              <a:buSzPct val="80000"/>
-              <a:buFont typeface="Wingdings 3" charset="2"/>
-              <a:buChar char=""/>
-              <a:defRPr sz="1200" kern="1200">
-                <a:solidFill>
-                  <a:schemeClr val="dk1"/>
-                </a:solidFill>
-                <a:latin typeface="+mn-lt"/>
-                <a:ea typeface="+mn-ea"/>
-                <a:cs typeface="+mn-cs"/>
-              </a:defRPr>
-            </a:lvl7pPr>
-            <a:lvl8pPr marL="3429000" indent="-228600" algn="l" defTabSz="457200" rtl="0" eaLnBrk="1" latinLnBrk="0" hangingPunct="1">
-              <a:spcBef>
-                <a:spcPts val="1000"/>
-              </a:spcBef>
-              <a:spcAft>
-                <a:spcPts val="0"/>
-              </a:spcAft>
-              <a:buClr>
-                <a:schemeClr val="accent1"/>
-              </a:buClr>
-              <a:buSzPct val="80000"/>
-              <a:buFont typeface="Wingdings 3" charset="2"/>
-              <a:buChar char=""/>
-              <a:defRPr sz="1200" kern="1200">
-                <a:solidFill>
-                  <a:schemeClr val="dk1"/>
-                </a:solidFill>
-                <a:latin typeface="+mn-lt"/>
-                <a:ea typeface="+mn-ea"/>
-                <a:cs typeface="+mn-cs"/>
-              </a:defRPr>
-            </a:lvl8pPr>
-            <a:lvl9pPr marL="3886200" indent="-228600" algn="l" defTabSz="457200" rtl="0" eaLnBrk="1" latinLnBrk="0" hangingPunct="1">
-              <a:spcBef>
-                <a:spcPts val="1000"/>
-              </a:spcBef>
-              <a:spcAft>
-                <a:spcPts val="0"/>
-              </a:spcAft>
-              <a:buClr>
-                <a:schemeClr val="accent1"/>
-              </a:buClr>
-              <a:buSzPct val="80000"/>
-              <a:buFont typeface="Wingdings 3" charset="2"/>
-              <a:buChar char=""/>
-              <a:defRPr sz="1200" kern="1200">
-                <a:solidFill>
-                  <a:schemeClr val="dk1"/>
-                </a:solidFill>
-                <a:latin typeface="+mn-lt"/>
-                <a:ea typeface="+mn-ea"/>
-                <a:cs typeface="+mn-cs"/>
-              </a:defRPr>
-            </a:lvl9pPr>
-          </a:lstStyle>
-          <a:p>
-            <a:pPr marL="0" indent="0">
-              <a:buNone/>
-            </a:pPr>
-            <a:r>
-              <a:rPr lang="en-US" sz="1600" b="1" dirty="0">
-                <a:solidFill>
-                  <a:schemeClr val="tx1">
-                    <a:lumMod val="75000"/>
-                  </a:schemeClr>
-                </a:solidFill>
-              </a:rPr>
-              <a:t>Subject code:</a:t>
-            </a:r>
-            <a:r>
-              <a:rPr lang="en-US" sz="1600" dirty="0">
-                <a:solidFill>
-                  <a:schemeClr val="tx1">
-                    <a:lumMod val="75000"/>
-                  </a:schemeClr>
-                </a:solidFill>
-              </a:rPr>
-              <a:t> EC-210</a:t>
-            </a:r>
-          </a:p>
-          <a:p>
-            <a:pPr marL="0" indent="0">
-              <a:buNone/>
-            </a:pPr>
-            <a:r>
-              <a:rPr lang="en-US" sz="1600" b="1" dirty="0">
-                <a:solidFill>
-                  <a:schemeClr val="tx1">
-                    <a:lumMod val="75000"/>
-                  </a:schemeClr>
-                </a:solidFill>
-              </a:rPr>
-              <a:t>Scholar ID: </a:t>
-            </a:r>
-            <a:r>
-              <a:rPr lang="en-US" sz="1600" dirty="0">
-                <a:solidFill>
-                  <a:schemeClr val="tx1">
-                    <a:lumMod val="75000"/>
-                  </a:schemeClr>
-                </a:solidFill>
-              </a:rPr>
-              <a:t>18-14-071</a:t>
             </a:r>
           </a:p>
         </p:txBody>
@@ -40440,33 +40062,6 @@
                             </p:childTnLst>
                           </p:cTn>
                         </p:par>
-                        <p:par>
-                          <p:cTn id="11" fill="hold">
-                            <p:stCondLst>
-                              <p:cond delay="1000"/>
-                            </p:stCondLst>
-                            <p:childTnLst>
-                              <p:par>
-                                <p:cTn id="12" presetID="6" presetClass="emph" presetSubtype="0" repeatCount="indefinite" fill="hold" grpId="0" nodeType="afterEffect">
-                                  <p:stCondLst>
-                                    <p:cond delay="0"/>
-                                  </p:stCondLst>
-                                  <p:childTnLst>
-                                    <p:animScale>
-                                      <p:cBhvr>
-                                        <p:cTn id="13" dur="2000" fill="hold"/>
-                                        <p:tgtEl>
-                                          <p:spTgt spid="4"/>
-                                        </p:tgtEl>
-                                      </p:cBhvr>
-                                      <p:by x="150000" y="150000"/>
-                                    </p:animScale>
-                                  </p:childTnLst>
-                                </p:cTn>
-                              </p:par>
-                            </p:childTnLst>
-                          </p:cTn>
-                        </p:par>
                       </p:childTnLst>
                     </p:cTn>
                   </p:par>
@@ -40493,7 +40088,6 @@
     </p:tnLst>
     <p:bldLst>
       <p:bldP spid="2" grpId="0"/>
-      <p:bldP spid="4" grpId="0"/>
     </p:bldLst>
   </p:timing>
 </p:sld>

</xml_diff>